<commit_message>
docs: mark external services in architecture
</commit_message>
<xml_diff>
--- a/backend/doc/architecture.pptx
+++ b/backend/doc/architecture.pptx
@@ -104,6 +104,11 @@
       </a:defRPr>
     </a:lvl9pPr>
   </p:defaultTextStyle>
+  <p:extLst>
+    <p:ext uri="{EFAFB233-063F-42B5-8137-9DF3F51BA10A}">
+      <p15:sldGuideLst xmlns:p15="http://schemas.microsoft.com/office/powerpoint/2012/main"/>
+    </p:ext>
+  </p:extLst>
 </p:presentation>
 </file>
 
@@ -256,7 +261,7 @@
           <a:p>
             <a:fld id="{DE6E6153-6B51-4F1F-8817-34DBA44E1038}" type="datetimeFigureOut">
               <a:rPr lang="de-CH" smtClean="0"/>
-              <a:t>31.10.2025</a:t>
+              <a:t>01.11.25</a:t>
             </a:fld>
             <a:endParaRPr lang="de-CH"/>
           </a:p>
@@ -310,7 +315,7 @@
           <a:p>
             <a:fld id="{610D89E3-305A-4E04-9FA6-E4A32CC206B6}" type="slidenum">
               <a:rPr lang="de-CH" smtClean="0"/>
-              <a:t>‹Nr.›</a:t>
+              <a:t>‹#›</a:t>
             </a:fld>
             <a:endParaRPr lang="de-CH"/>
           </a:p>
@@ -456,7 +461,7 @@
           <a:p>
             <a:fld id="{DE6E6153-6B51-4F1F-8817-34DBA44E1038}" type="datetimeFigureOut">
               <a:rPr lang="de-CH" smtClean="0"/>
-              <a:t>31.10.2025</a:t>
+              <a:t>01.11.25</a:t>
             </a:fld>
             <a:endParaRPr lang="de-CH"/>
           </a:p>
@@ -510,7 +515,7 @@
           <a:p>
             <a:fld id="{610D89E3-305A-4E04-9FA6-E4A32CC206B6}" type="slidenum">
               <a:rPr lang="de-CH" smtClean="0"/>
-              <a:t>‹Nr.›</a:t>
+              <a:t>‹#›</a:t>
             </a:fld>
             <a:endParaRPr lang="de-CH"/>
           </a:p>
@@ -666,7 +671,7 @@
           <a:p>
             <a:fld id="{DE6E6153-6B51-4F1F-8817-34DBA44E1038}" type="datetimeFigureOut">
               <a:rPr lang="de-CH" smtClean="0"/>
-              <a:t>31.10.2025</a:t>
+              <a:t>01.11.25</a:t>
             </a:fld>
             <a:endParaRPr lang="de-CH"/>
           </a:p>
@@ -720,7 +725,7 @@
           <a:p>
             <a:fld id="{610D89E3-305A-4E04-9FA6-E4A32CC206B6}" type="slidenum">
               <a:rPr lang="de-CH" smtClean="0"/>
-              <a:t>‹Nr.›</a:t>
+              <a:t>‹#›</a:t>
             </a:fld>
             <a:endParaRPr lang="de-CH"/>
           </a:p>
@@ -866,7 +871,7 @@
           <a:p>
             <a:fld id="{DE6E6153-6B51-4F1F-8817-34DBA44E1038}" type="datetimeFigureOut">
               <a:rPr lang="de-CH" smtClean="0"/>
-              <a:t>31.10.2025</a:t>
+              <a:t>01.11.25</a:t>
             </a:fld>
             <a:endParaRPr lang="de-CH"/>
           </a:p>
@@ -920,7 +925,7 @@
           <a:p>
             <a:fld id="{610D89E3-305A-4E04-9FA6-E4A32CC206B6}" type="slidenum">
               <a:rPr lang="de-CH" smtClean="0"/>
-              <a:t>‹Nr.›</a:t>
+              <a:t>‹#›</a:t>
             </a:fld>
             <a:endParaRPr lang="de-CH"/>
           </a:p>
@@ -1142,7 +1147,7 @@
           <a:p>
             <a:fld id="{DE6E6153-6B51-4F1F-8817-34DBA44E1038}" type="datetimeFigureOut">
               <a:rPr lang="de-CH" smtClean="0"/>
-              <a:t>31.10.2025</a:t>
+              <a:t>01.11.25</a:t>
             </a:fld>
             <a:endParaRPr lang="de-CH"/>
           </a:p>
@@ -1196,7 +1201,7 @@
           <a:p>
             <a:fld id="{610D89E3-305A-4E04-9FA6-E4A32CC206B6}" type="slidenum">
               <a:rPr lang="de-CH" smtClean="0"/>
-              <a:t>‹Nr.›</a:t>
+              <a:t>‹#›</a:t>
             </a:fld>
             <a:endParaRPr lang="de-CH"/>
           </a:p>
@@ -1410,7 +1415,7 @@
           <a:p>
             <a:fld id="{DE6E6153-6B51-4F1F-8817-34DBA44E1038}" type="datetimeFigureOut">
               <a:rPr lang="de-CH" smtClean="0"/>
-              <a:t>31.10.2025</a:t>
+              <a:t>01.11.25</a:t>
             </a:fld>
             <a:endParaRPr lang="de-CH"/>
           </a:p>
@@ -1464,7 +1469,7 @@
           <a:p>
             <a:fld id="{610D89E3-305A-4E04-9FA6-E4A32CC206B6}" type="slidenum">
               <a:rPr lang="de-CH" smtClean="0"/>
-              <a:t>‹Nr.›</a:t>
+              <a:t>‹#›</a:t>
             </a:fld>
             <a:endParaRPr lang="de-CH"/>
           </a:p>
@@ -1825,7 +1830,7 @@
           <a:p>
             <a:fld id="{DE6E6153-6B51-4F1F-8817-34DBA44E1038}" type="datetimeFigureOut">
               <a:rPr lang="de-CH" smtClean="0"/>
-              <a:t>31.10.2025</a:t>
+              <a:t>01.11.25</a:t>
             </a:fld>
             <a:endParaRPr lang="de-CH"/>
           </a:p>
@@ -1879,7 +1884,7 @@
           <a:p>
             <a:fld id="{610D89E3-305A-4E04-9FA6-E4A32CC206B6}" type="slidenum">
               <a:rPr lang="de-CH" smtClean="0"/>
-              <a:t>‹Nr.›</a:t>
+              <a:t>‹#›</a:t>
             </a:fld>
             <a:endParaRPr lang="de-CH"/>
           </a:p>
@@ -1967,7 +1972,7 @@
           <a:p>
             <a:fld id="{DE6E6153-6B51-4F1F-8817-34DBA44E1038}" type="datetimeFigureOut">
               <a:rPr lang="de-CH" smtClean="0"/>
-              <a:t>31.10.2025</a:t>
+              <a:t>01.11.25</a:t>
             </a:fld>
             <a:endParaRPr lang="de-CH"/>
           </a:p>
@@ -2021,7 +2026,7 @@
           <a:p>
             <a:fld id="{610D89E3-305A-4E04-9FA6-E4A32CC206B6}" type="slidenum">
               <a:rPr lang="de-CH" smtClean="0"/>
-              <a:t>‹Nr.›</a:t>
+              <a:t>‹#›</a:t>
             </a:fld>
             <a:endParaRPr lang="de-CH"/>
           </a:p>
@@ -2080,7 +2085,7 @@
           <a:p>
             <a:fld id="{DE6E6153-6B51-4F1F-8817-34DBA44E1038}" type="datetimeFigureOut">
               <a:rPr lang="de-CH" smtClean="0"/>
-              <a:t>31.10.2025</a:t>
+              <a:t>01.11.25</a:t>
             </a:fld>
             <a:endParaRPr lang="de-CH"/>
           </a:p>
@@ -2134,7 +2139,7 @@
           <a:p>
             <a:fld id="{610D89E3-305A-4E04-9FA6-E4A32CC206B6}" type="slidenum">
               <a:rPr lang="de-CH" smtClean="0"/>
-              <a:t>‹Nr.›</a:t>
+              <a:t>‹#›</a:t>
             </a:fld>
             <a:endParaRPr lang="de-CH"/>
           </a:p>
@@ -2393,7 +2398,7 @@
           <a:p>
             <a:fld id="{DE6E6153-6B51-4F1F-8817-34DBA44E1038}" type="datetimeFigureOut">
               <a:rPr lang="de-CH" smtClean="0"/>
-              <a:t>31.10.2025</a:t>
+              <a:t>01.11.25</a:t>
             </a:fld>
             <a:endParaRPr lang="de-CH"/>
           </a:p>
@@ -2447,7 +2452,7 @@
           <a:p>
             <a:fld id="{610D89E3-305A-4E04-9FA6-E4A32CC206B6}" type="slidenum">
               <a:rPr lang="de-CH" smtClean="0"/>
-              <a:t>‹Nr.›</a:t>
+              <a:t>‹#›</a:t>
             </a:fld>
             <a:endParaRPr lang="de-CH"/>
           </a:p>
@@ -2682,7 +2687,7 @@
           <a:p>
             <a:fld id="{DE6E6153-6B51-4F1F-8817-34DBA44E1038}" type="datetimeFigureOut">
               <a:rPr lang="de-CH" smtClean="0"/>
-              <a:t>31.10.2025</a:t>
+              <a:t>01.11.25</a:t>
             </a:fld>
             <a:endParaRPr lang="de-CH"/>
           </a:p>
@@ -2736,7 +2741,7 @@
           <a:p>
             <a:fld id="{610D89E3-305A-4E04-9FA6-E4A32CC206B6}" type="slidenum">
               <a:rPr lang="de-CH" smtClean="0"/>
-              <a:t>‹Nr.›</a:t>
+              <a:t>‹#›</a:t>
             </a:fld>
             <a:endParaRPr lang="de-CH"/>
           </a:p>
@@ -2925,7 +2930,7 @@
           <a:p>
             <a:fld id="{DE6E6153-6B51-4F1F-8817-34DBA44E1038}" type="datetimeFigureOut">
               <a:rPr lang="de-CH" smtClean="0"/>
-              <a:t>31.10.2025</a:t>
+              <a:t>01.11.25</a:t>
             </a:fld>
             <a:endParaRPr lang="de-CH"/>
           </a:p>
@@ -3015,7 +3020,7 @@
           <a:p>
             <a:fld id="{610D89E3-305A-4E04-9FA6-E4A32CC206B6}" type="slidenum">
               <a:rPr lang="de-CH" smtClean="0"/>
-              <a:t>‹Nr.›</a:t>
+              <a:t>‹#›</a:t>
             </a:fld>
             <a:endParaRPr lang="de-CH"/>
           </a:p>
@@ -3344,6 +3349,50 @@
       </p:grpSpPr>
       <p:sp>
         <p:nvSpPr>
+          <p:cNvPr id="4" name="Rechteck 16">
+            <a:extLst>
+              <a:ext uri="{FF2B5EF4-FFF2-40B4-BE49-F238E27FC236}">
+                <a16:creationId xmlns:a16="http://schemas.microsoft.com/office/drawing/2014/main" id="{DAF1E3C2-9D8D-862A-F48F-3C2456021A27}"/>
+              </a:ext>
+            </a:extLst>
+          </p:cNvPr>
+          <p:cNvSpPr/>
+          <p:nvPr/>
+        </p:nvSpPr>
+        <p:spPr>
+          <a:xfrm>
+            <a:off x="2112021" y="2838387"/>
+            <a:ext cx="2675211" cy="3857626"/>
+          </a:xfrm>
+          <a:prstGeom prst="rect">
+            <a:avLst/>
+          </a:prstGeom>
+        </p:spPr>
+        <p:style>
+          <a:lnRef idx="1">
+            <a:schemeClr val="dk1"/>
+          </a:lnRef>
+          <a:fillRef idx="2">
+            <a:schemeClr val="dk1"/>
+          </a:fillRef>
+          <a:effectRef idx="1">
+            <a:schemeClr val="dk1"/>
+          </a:effectRef>
+          <a:fontRef idx="minor">
+            <a:schemeClr val="dk1"/>
+          </a:fontRef>
+        </p:style>
+        <p:txBody>
+          <a:bodyPr rtlCol="0" anchor="ctr"/>
+          <a:lstStyle/>
+          <a:p>
+            <a:pPr algn="ctr"/>
+            <a:endParaRPr lang="de-CH" dirty="0"/>
+          </a:p>
+        </p:txBody>
+      </p:sp>
+      <p:sp>
+        <p:nvSpPr>
           <p:cNvPr id="17" name="Rechteck 16">
             <a:extLst>
               <a:ext uri="{FF2B5EF4-FFF2-40B4-BE49-F238E27FC236}">
@@ -5099,6 +5148,41 @@
           </a:fontRef>
         </p:style>
       </p:cxnSp>
+      <p:sp>
+        <p:nvSpPr>
+          <p:cNvPr id="3" name="Textfeld 41">
+            <a:extLst>
+              <a:ext uri="{FF2B5EF4-FFF2-40B4-BE49-F238E27FC236}">
+                <a16:creationId xmlns:a16="http://schemas.microsoft.com/office/drawing/2014/main" id="{671DC4F8-23B8-3184-BFB8-B4B3F402E585}"/>
+              </a:ext>
+            </a:extLst>
+          </p:cNvPr>
+          <p:cNvSpPr txBox="1"/>
+          <p:nvPr/>
+        </p:nvSpPr>
+        <p:spPr>
+          <a:xfrm>
+            <a:off x="2151472" y="2887498"/>
+            <a:ext cx="825811" cy="369332"/>
+          </a:xfrm>
+          <a:prstGeom prst="rect">
+            <a:avLst/>
+          </a:prstGeom>
+          <a:noFill/>
+        </p:spPr>
+        <p:txBody>
+          <a:bodyPr wrap="square" rtlCol="0">
+            <a:spAutoFit/>
+          </a:bodyPr>
+          <a:lstStyle/>
+          <a:p>
+            <a:r>
+              <a:rPr lang="de-CH" dirty="0"/>
+              <a:t>Extern</a:t>
+            </a:r>
+          </a:p>
+        </p:txBody>
+      </p:sp>
     </p:spTree>
     <p:extLst>
       <p:ext uri="{BB962C8B-B14F-4D97-AF65-F5344CB8AC3E}">

</xml_diff>